<commit_message>
changed crd kind from trigger to course
</commit_message>
<xml_diff>
--- a/kubernetes/08_ingress.pptx
+++ b/kubernetes/08_ingress.pptx
@@ -21769,6 +21769,66 @@
           <a:chExt cx="0" cy="0"/>
         </a:xfrm>
       </p:grpSpPr>
+      <p:pic>
+        <p:nvPicPr>
+          <p:cNvPr id="10" name="Picture 9">
+            <a:extLst>
+              <a:ext uri="{FF2B5EF4-FFF2-40B4-BE49-F238E27FC236}">
+                <a16:creationId xmlns:a16="http://schemas.microsoft.com/office/drawing/2014/main" id="{5F486A8E-D3C4-4635-872A-36BC6C98C89F}"/>
+              </a:ext>
+            </a:extLst>
+          </p:cNvPr>
+          <p:cNvPicPr>
+            <a:picLocks noChangeAspect="1"/>
+          </p:cNvPicPr>
+          <p:nvPr/>
+        </p:nvPicPr>
+        <p:blipFill>
+          <a:blip r:embed="rId2"/>
+          <a:stretch>
+            <a:fillRect/>
+          </a:stretch>
+        </p:blipFill>
+        <p:spPr>
+          <a:xfrm>
+            <a:off x="8157670" y="2202547"/>
+            <a:ext cx="3352381" cy="2504762"/>
+          </a:xfrm>
+          <a:prstGeom prst="rect">
+            <a:avLst/>
+          </a:prstGeom>
+        </p:spPr>
+      </p:pic>
+      <p:pic>
+        <p:nvPicPr>
+          <p:cNvPr id="2" name="Picture 1">
+            <a:extLst>
+              <a:ext uri="{FF2B5EF4-FFF2-40B4-BE49-F238E27FC236}">
+                <a16:creationId xmlns:a16="http://schemas.microsoft.com/office/drawing/2014/main" id="{FECEE425-8037-405B-9166-E619DC0F3E1B}"/>
+              </a:ext>
+            </a:extLst>
+          </p:cNvPr>
+          <p:cNvPicPr>
+            <a:picLocks noChangeAspect="1"/>
+          </p:cNvPicPr>
+          <p:nvPr/>
+        </p:nvPicPr>
+        <p:blipFill>
+          <a:blip r:embed="rId3"/>
+          <a:stretch>
+            <a:fillRect/>
+          </a:stretch>
+        </p:blipFill>
+        <p:spPr>
+          <a:xfrm>
+            <a:off x="504001" y="1056781"/>
+            <a:ext cx="2796385" cy="5387153"/>
+          </a:xfrm>
+          <a:prstGeom prst="rect">
+            <a:avLst/>
+          </a:prstGeom>
+        </p:spPr>
+      </p:pic>
       <p:sp>
         <p:nvSpPr>
           <p:cNvPr id="3" name="Title 2">
@@ -21797,66 +21857,6 @@
           </a:p>
         </p:txBody>
       </p:sp>
-      <p:pic>
-        <p:nvPicPr>
-          <p:cNvPr id="4" name="Picture 3">
-            <a:extLst>
-              <a:ext uri="{FF2B5EF4-FFF2-40B4-BE49-F238E27FC236}">
-                <a16:creationId xmlns:a16="http://schemas.microsoft.com/office/drawing/2014/main" id="{6D56E09A-8304-4587-AFFD-4D76CD57A011}"/>
-              </a:ext>
-            </a:extLst>
-          </p:cNvPr>
-          <p:cNvPicPr>
-            <a:picLocks noChangeAspect="1"/>
-          </p:cNvPicPr>
-          <p:nvPr/>
-        </p:nvPicPr>
-        <p:blipFill>
-          <a:blip r:embed="rId2"/>
-          <a:stretch>
-            <a:fillRect/>
-          </a:stretch>
-        </p:blipFill>
-        <p:spPr>
-          <a:xfrm>
-            <a:off x="8047942" y="2423730"/>
-            <a:ext cx="3304762" cy="2380952"/>
-          </a:xfrm>
-          <a:prstGeom prst="rect">
-            <a:avLst/>
-          </a:prstGeom>
-        </p:spPr>
-      </p:pic>
-      <p:pic>
-        <p:nvPicPr>
-          <p:cNvPr id="5" name="Picture 4">
-            <a:extLst>
-              <a:ext uri="{FF2B5EF4-FFF2-40B4-BE49-F238E27FC236}">
-                <a16:creationId xmlns:a16="http://schemas.microsoft.com/office/drawing/2014/main" id="{2B160136-278D-4798-983B-1F6D496BE5EF}"/>
-              </a:ext>
-            </a:extLst>
-          </p:cNvPr>
-          <p:cNvPicPr>
-            <a:picLocks noChangeAspect="1"/>
-          </p:cNvPicPr>
-          <p:nvPr/>
-        </p:nvPicPr>
-        <p:blipFill>
-          <a:blip r:embed="rId3"/>
-          <a:stretch>
-            <a:fillRect/>
-          </a:stretch>
-        </p:blipFill>
-        <p:spPr>
-          <a:xfrm>
-            <a:off x="906337" y="1124712"/>
-            <a:ext cx="2720834" cy="4978988"/>
-          </a:xfrm>
-          <a:prstGeom prst="rect">
-            <a:avLst/>
-          </a:prstGeom>
-        </p:spPr>
-      </p:pic>
       <p:sp>
         <p:nvSpPr>
           <p:cNvPr id="6" name="Speech Bubble: Rectangle 5">
@@ -21953,7 +21953,7 @@
         </p:nvSpPr>
         <p:spPr bwMode="gray">
           <a:xfrm>
-            <a:off x="3814723" y="3486190"/>
+            <a:off x="3558691" y="2920579"/>
             <a:ext cx="3067662" cy="829778"/>
           </a:xfrm>
           <a:prstGeom prst="wedgeRectCallout">

</xml_diff>